<commit_message>
Slides 2, 3 added to the presentation
</commit_message>
<xml_diff>
--- a/docs/FitForm_Presentation.pptx
+++ b/docs/FitForm_Presentation.pptx
@@ -212,7 +212,7 @@
           <a:p>
             <a:fld id="{67ED9CE7-4501-452A-A9E3-0902AD605B21}" type="datetimeFigureOut">
               <a:rPr lang="ru-RU" smtClean="0"/>
-              <a:t>04.08.2024</a:t>
+              <a:t>06.08.2024</a:t>
             </a:fld>
             <a:endParaRPr lang="ru-RU"/>
           </a:p>
@@ -14078,8 +14078,8 @@
         </p:nvSpPr>
         <p:spPr>
           <a:xfrm>
-            <a:off x="1911900" y="2472930"/>
-            <a:ext cx="7997910" cy="2413350"/>
+            <a:off x="1090920" y="1657020"/>
+            <a:ext cx="4860735" cy="1734690"/>
           </a:xfrm>
           <a:prstGeom prst="rect">
             <a:avLst/>
@@ -14109,19 +14109,6 @@
           <a:p>
             <a:r>
               <a:rPr lang="en-US" b="1" dirty="0"/>
-              <a:t>Overview</a:t>
-            </a:r>
-          </a:p>
-          <a:p>
-            <a:endParaRPr lang="en-US" b="1" dirty="0"/>
-          </a:p>
-          <a:p>
-            <a:pPr>
-              <a:buFont typeface="Arial" panose="020B0604020202020204" pitchFamily="34" charset="0"/>
-              <a:buChar char="•"/>
-            </a:pPr>
-            <a:r>
-              <a:rPr lang="en-US" b="1" dirty="0"/>
               <a:t>Purpose</a:t>
             </a:r>
             <a:r>
@@ -14129,18 +14116,111 @@
               <a:t>: To engage users, guide them, and support them in their fitness journey.</a:t>
             </a:r>
           </a:p>
-          <a:p>
-            <a:pPr>
-              <a:buFont typeface="Arial" panose="020B0604020202020204" pitchFamily="34" charset="0"/>
-              <a:buChar char="•"/>
-            </a:pPr>
-            <a:endParaRPr lang="en-US" dirty="0"/>
-          </a:p>
-          <a:p>
-            <a:pPr>
-              <a:buFont typeface="Arial" panose="020B0604020202020204" pitchFamily="34" charset="0"/>
-              <a:buChar char="•"/>
-            </a:pPr>
+        </p:txBody>
+      </p:sp>
+      <p:pic>
+        <p:nvPicPr>
+          <p:cNvPr id="4" name="Рисунок 3">
+            <a:extLst>
+              <a:ext uri="{FF2B5EF4-FFF2-40B4-BE49-F238E27FC236}">
+                <a16:creationId xmlns:a16="http://schemas.microsoft.com/office/drawing/2014/main" id="{52CB8585-8659-BAFC-739A-36EE1022E003}"/>
+              </a:ext>
+            </a:extLst>
+          </p:cNvPr>
+          <p:cNvPicPr>
+            <a:picLocks noChangeAspect="1"/>
+          </p:cNvPicPr>
+          <p:nvPr/>
+        </p:nvPicPr>
+        <p:blipFill>
+          <a:blip r:embed="rId2"/>
+          <a:stretch>
+            <a:fillRect/>
+          </a:stretch>
+        </p:blipFill>
+        <p:spPr>
+          <a:xfrm>
+            <a:off x="7761667" y="456480"/>
+            <a:ext cx="3620025" cy="2413350"/>
+          </a:xfrm>
+          <a:prstGeom prst="rect">
+            <a:avLst/>
+          </a:prstGeom>
+        </p:spPr>
+      </p:pic>
+      <p:pic>
+        <p:nvPicPr>
+          <p:cNvPr id="6" name="Рисунок 5">
+            <a:extLst>
+              <a:ext uri="{FF2B5EF4-FFF2-40B4-BE49-F238E27FC236}">
+                <a16:creationId xmlns:a16="http://schemas.microsoft.com/office/drawing/2014/main" id="{90633A11-5F58-5908-45FA-23A240D8FE1E}"/>
+              </a:ext>
+            </a:extLst>
+          </p:cNvPr>
+          <p:cNvPicPr>
+            <a:picLocks noChangeAspect="1"/>
+          </p:cNvPicPr>
+          <p:nvPr/>
+        </p:nvPicPr>
+        <p:blipFill>
+          <a:blip r:embed="rId3"/>
+          <a:stretch>
+            <a:fillRect/>
+          </a:stretch>
+        </p:blipFill>
+        <p:spPr>
+          <a:xfrm>
+            <a:off x="504000" y="3679605"/>
+            <a:ext cx="5724525" cy="2809875"/>
+          </a:xfrm>
+          <a:prstGeom prst="rect">
+            <a:avLst/>
+          </a:prstGeom>
+        </p:spPr>
+      </p:pic>
+      <p:sp>
+        <p:nvSpPr>
+          <p:cNvPr id="7" name="CustomShape 2">
+            <a:extLst>
+              <a:ext uri="{FF2B5EF4-FFF2-40B4-BE49-F238E27FC236}">
+                <a16:creationId xmlns:a16="http://schemas.microsoft.com/office/drawing/2014/main" id="{980FA3DE-7773-5EAA-6739-F8BB3079A763}"/>
+              </a:ext>
+            </a:extLst>
+          </p:cNvPr>
+          <p:cNvSpPr/>
+          <p:nvPr/>
+        </p:nvSpPr>
+        <p:spPr>
+          <a:xfrm>
+            <a:off x="7212330" y="4223101"/>
+            <a:ext cx="4282388" cy="1874670"/>
+          </a:xfrm>
+          <a:prstGeom prst="rect">
+            <a:avLst/>
+          </a:prstGeom>
+          <a:noFill/>
+          <a:ln w="0">
+            <a:noFill/>
+          </a:ln>
+        </p:spPr>
+        <p:style>
+          <a:lnRef idx="0">
+            <a:scrgbClr r="0" g="0" b="0"/>
+          </a:lnRef>
+          <a:fillRef idx="0">
+            <a:scrgbClr r="0" g="0" b="0"/>
+          </a:fillRef>
+          <a:effectRef idx="0">
+            <a:scrgbClr r="0" g="0" b="0"/>
+          </a:effectRef>
+          <a:fontRef idx="minor"/>
+        </p:style>
+        <p:txBody>
+          <a:bodyPr lIns="90000" tIns="45000" rIns="90000" bIns="45000" anchor="t">
+            <a:noAutofit/>
+          </a:bodyPr>
+          <a:lstStyle/>
+          <a:p>
             <a:r>
               <a:rPr lang="en-US" b="1" dirty="0"/>
               <a:t>Goal</a:t>
@@ -14386,8 +14466,8 @@
         </p:nvSpPr>
         <p:spPr>
           <a:xfrm>
-            <a:off x="1056420" y="2165490"/>
-            <a:ext cx="9067680" cy="1434960"/>
+            <a:off x="5764068" y="1353960"/>
+            <a:ext cx="5653223" cy="2326500"/>
           </a:xfrm>
           <a:prstGeom prst="rect">
             <a:avLst/>
@@ -14417,16 +14497,6 @@
           <a:p>
             <a:r>
               <a:rPr lang="en-US" b="1" dirty="0"/>
-              <a:t>Features</a:t>
-            </a:r>
-          </a:p>
-          <a:p>
-            <a:pPr>
-              <a:buFont typeface="Arial" panose="020B0604020202020204" pitchFamily="34" charset="0"/>
-              <a:buChar char="•"/>
-            </a:pPr>
-            <a:r>
-              <a:rPr lang="en-US" b="1" dirty="0"/>
               <a:t>Caloric + Macro Nutritional Calculator</a:t>
             </a:r>
             <a:r>
@@ -14465,10 +14535,92 @@
             </a:r>
           </a:p>
           <a:p>
-            <a:pPr>
-              <a:buFont typeface="Arial" panose="020B0604020202020204" pitchFamily="34" charset="0"/>
-              <a:buChar char="•"/>
-            </a:pPr>
+            <a:pPr algn="r">
+              <a:lnSpc>
+                <a:spcPct val="115000"/>
+              </a:lnSpc>
+            </a:pPr>
+            <a:endParaRPr lang="ru-RU" sz="1800" dirty="0">
+              <a:effectLst/>
+              <a:latin typeface="Arial" panose="020B0604020202020204" pitchFamily="34" charset="0"/>
+              <a:ea typeface="Arial" panose="020B0604020202020204" pitchFamily="34" charset="0"/>
+            </a:endParaRPr>
+          </a:p>
+        </p:txBody>
+      </p:sp>
+      <p:pic>
+        <p:nvPicPr>
+          <p:cNvPr id="4" name="Рисунок 3">
+            <a:extLst>
+              <a:ext uri="{FF2B5EF4-FFF2-40B4-BE49-F238E27FC236}">
+                <a16:creationId xmlns:a16="http://schemas.microsoft.com/office/drawing/2014/main" id="{F17D0097-E73E-CCCD-7A3F-91E180FC959C}"/>
+              </a:ext>
+            </a:extLst>
+          </p:cNvPr>
+          <p:cNvPicPr>
+            <a:picLocks noChangeAspect="1"/>
+          </p:cNvPicPr>
+          <p:nvPr/>
+        </p:nvPicPr>
+        <p:blipFill>
+          <a:blip r:embed="rId2"/>
+          <a:stretch>
+            <a:fillRect/>
+          </a:stretch>
+        </p:blipFill>
+        <p:spPr>
+          <a:xfrm>
+            <a:off x="1034407" y="1079999"/>
+            <a:ext cx="3434723" cy="3011829"/>
+          </a:xfrm>
+          <a:prstGeom prst="rect">
+            <a:avLst/>
+          </a:prstGeom>
+        </p:spPr>
+      </p:pic>
+      <p:sp>
+        <p:nvSpPr>
+          <p:cNvPr id="5" name="CustomShape 2">
+            <a:extLst>
+              <a:ext uri="{FF2B5EF4-FFF2-40B4-BE49-F238E27FC236}">
+                <a16:creationId xmlns:a16="http://schemas.microsoft.com/office/drawing/2014/main" id="{25B49EF9-EABD-F9D9-12AA-2A9BC86D9DDA}"/>
+              </a:ext>
+            </a:extLst>
+          </p:cNvPr>
+          <p:cNvSpPr/>
+          <p:nvPr/>
+        </p:nvSpPr>
+        <p:spPr>
+          <a:xfrm>
+            <a:off x="5872919" y="3869613"/>
+            <a:ext cx="6045247" cy="1028588"/>
+          </a:xfrm>
+          <a:prstGeom prst="rect">
+            <a:avLst/>
+          </a:prstGeom>
+          <a:noFill/>
+          <a:ln w="0">
+            <a:noFill/>
+          </a:ln>
+        </p:spPr>
+        <p:style>
+          <a:lnRef idx="0">
+            <a:scrgbClr r="0" g="0" b="0"/>
+          </a:lnRef>
+          <a:fillRef idx="0">
+            <a:scrgbClr r="0" g="0" b="0"/>
+          </a:fillRef>
+          <a:effectRef idx="0">
+            <a:scrgbClr r="0" g="0" b="0"/>
+          </a:effectRef>
+          <a:fontRef idx="minor"/>
+        </p:style>
+        <p:txBody>
+          <a:bodyPr lIns="90000" tIns="45000" rIns="90000" bIns="45000" anchor="t">
+            <a:noAutofit/>
+          </a:bodyPr>
+          <a:lstStyle/>
+          <a:p>
             <a:r>
               <a:rPr lang="en-US" b="1" dirty="0"/>
               <a:t>Optional Features</a:t>
@@ -14512,6 +14664,36 @@
           </a:p>
         </p:txBody>
       </p:sp>
+      <p:pic>
+        <p:nvPicPr>
+          <p:cNvPr id="7" name="Рисунок 6">
+            <a:extLst>
+              <a:ext uri="{FF2B5EF4-FFF2-40B4-BE49-F238E27FC236}">
+                <a16:creationId xmlns:a16="http://schemas.microsoft.com/office/drawing/2014/main" id="{D8EB87E5-F8C3-DADA-265B-C055D11FE2A2}"/>
+              </a:ext>
+            </a:extLst>
+          </p:cNvPr>
+          <p:cNvPicPr>
+            <a:picLocks noChangeAspect="1"/>
+          </p:cNvPicPr>
+          <p:nvPr/>
+        </p:nvPicPr>
+        <p:blipFill>
+          <a:blip r:embed="rId3"/>
+          <a:stretch>
+            <a:fillRect/>
+          </a:stretch>
+        </p:blipFill>
+        <p:spPr>
+          <a:xfrm>
+            <a:off x="2751768" y="4875701"/>
+            <a:ext cx="9166398" cy="1804597"/>
+          </a:xfrm>
+          <a:prstGeom prst="rect">
+            <a:avLst/>
+          </a:prstGeom>
+        </p:spPr>
+      </p:pic>
     </p:spTree>
   </p:cSld>
   <p:clrMapOvr>

</xml_diff>